<commit_message>
adds HTMLK Fundamentals and MVC Basics
</commit_message>
<xml_diff>
--- a/REPO_MarksCodeAndPPTs/DotNetPPTs/dotnetWeek3Ppts/D12_.NET_HTMLFundamentals.pptx
+++ b/REPO_MarksCodeAndPPTs/DotNetPPTs/dotnetWeek3Ppts/D12_.NET_HTMLFundamentals.pptx
@@ -27,6 +27,7 @@
     <p:sldId id="279" r:id="rId21"/>
     <p:sldId id="280" r:id="rId22"/>
     <p:sldId id="281" r:id="rId23"/>
+    <p:sldId id="285" r:id="rId24"/>
   </p:sldIdLst>
   <p:sldSz cx="12192000" cy="6858000"/>
   <p:notesSz cx="6858000" cy="9144000"/>
@@ -152,6 +153,7 @@
             <p14:sldId id="279"/>
             <p14:sldId id="280"/>
             <p14:sldId id="281"/>
+            <p14:sldId id="285"/>
           </p14:sldIdLst>
         </p14:section>
       </p14:sectionLst>
@@ -416,7 +418,7 @@
           <a:p>
             <a:fld id="{9184DA70-C731-4C70-880D-CCD4705E623C}" type="datetime1">
               <a:rPr lang="en-US" smtClean="0"/>
-              <a:t>3/23/2020</a:t>
+              <a:t>3/24/2020</a:t>
             </a:fld>
             <a:endParaRPr lang="en-US" dirty="0"/>
           </a:p>
@@ -604,7 +606,7 @@
           <a:p>
             <a:fld id="{B612A279-0833-481D-8C56-F67FD0AC6C50}" type="datetime1">
               <a:rPr lang="en-US" smtClean="0"/>
-              <a:t>3/23/2020</a:t>
+              <a:t>3/24/2020</a:t>
             </a:fld>
             <a:endParaRPr lang="en-US" dirty="0"/>
           </a:p>
@@ -846,7 +848,7 @@
           <a:p>
             <a:fld id="{6587DA83-5663-4C9C-B9AA-0B40A3DAFF81}" type="datetime1">
               <a:rPr lang="en-US" smtClean="0"/>
-              <a:t>3/23/2020</a:t>
+              <a:t>3/24/2020</a:t>
             </a:fld>
             <a:endParaRPr lang="en-US" dirty="0"/>
           </a:p>
@@ -1034,7 +1036,7 @@
           <a:p>
             <a:fld id="{4BE1D723-8F53-4F53-90B0-1982A396982E}" type="datetime1">
               <a:rPr lang="en-US" smtClean="0"/>
-              <a:t>3/23/2020</a:t>
+              <a:t>3/24/2020</a:t>
             </a:fld>
             <a:endParaRPr lang="en-US" dirty="0"/>
           </a:p>
@@ -1407,7 +1409,7 @@
           <a:p>
             <a:fld id="{97669AF7-7BEB-44E4-9852-375E34362B5B}" type="datetime1">
               <a:rPr lang="en-US" smtClean="0"/>
-              <a:t>3/23/2020</a:t>
+              <a:t>3/24/2020</a:t>
             </a:fld>
             <a:endParaRPr lang="en-US" dirty="0"/>
           </a:p>
@@ -1662,7 +1664,7 @@
           <a:p>
             <a:fld id="{BAAAC38D-0552-4C82-B593-E6124DFADBE2}" type="datetime1">
               <a:rPr lang="en-US" smtClean="0"/>
-              <a:t>3/23/2020</a:t>
+              <a:t>3/24/2020</a:t>
             </a:fld>
             <a:endParaRPr lang="en-US" dirty="0"/>
           </a:p>
@@ -2059,7 +2061,7 @@
           <a:p>
             <a:fld id="{D9DF0F1C-5577-4ACB-BB62-DF8F3C494C7E}" type="datetime1">
               <a:rPr lang="en-US" smtClean="0"/>
-              <a:t>3/23/2020</a:t>
+              <a:t>3/24/2020</a:t>
             </a:fld>
             <a:endParaRPr lang="en-US" dirty="0"/>
           </a:p>
@@ -2195,7 +2197,7 @@
           <a:p>
             <a:fld id="{1775B394-D9F9-4F0C-B15D-605F45CB9E9F}" type="datetime1">
               <a:rPr lang="en-US" smtClean="0"/>
-              <a:t>3/23/2020</a:t>
+              <a:t>3/24/2020</a:t>
             </a:fld>
             <a:endParaRPr lang="en-US" dirty="0"/>
           </a:p>
@@ -2352,7 +2354,7 @@
           <a:p>
             <a:fld id="{39667345-2558-425A-8533-9BFDBCE15005}" type="datetime1">
               <a:rPr lang="en-US" smtClean="0"/>
-              <a:t>3/23/2020</a:t>
+              <a:t>3/24/2020</a:t>
             </a:fld>
             <a:endParaRPr lang="en-US" dirty="0"/>
           </a:p>
@@ -2681,7 +2683,7 @@
           <a:p>
             <a:fld id="{92BEA474-078D-4E9B-9B14-09A87B19DC46}" type="datetime1">
               <a:rPr lang="en-US" smtClean="0"/>
-              <a:t>3/23/2020</a:t>
+              <a:t>3/24/2020</a:t>
             </a:fld>
             <a:endParaRPr lang="en-US" dirty="0"/>
           </a:p>
@@ -3031,7 +3033,7 @@
           <a:p>
             <a:fld id="{4907D986-8816-4272-A432-0437A28A9828}" type="datetime1">
               <a:rPr lang="en-US" smtClean="0"/>
-              <a:t>3/23/2020</a:t>
+              <a:t>3/24/2020</a:t>
             </a:fld>
             <a:endParaRPr lang="en-US" dirty="0"/>
           </a:p>
@@ -3292,7 +3294,7 @@
           <a:p>
             <a:fld id="{62D6E202-B606-4609-B914-27C9371A1F6D}" type="datetime1">
               <a:rPr lang="en-US" smtClean="0"/>
-              <a:t>3/23/2020</a:t>
+              <a:t>3/24/2020</a:t>
             </a:fld>
             <a:endParaRPr lang="en-US" dirty="0"/>
           </a:p>
@@ -5365,7 +5367,7 @@
         </p:spPr>
         <p:txBody>
           <a:bodyPr>
-            <a:normAutofit fontScale="92500"/>
+            <a:normAutofit fontScale="92500" lnSpcReduction="10000"/>
           </a:bodyPr>
           <a:lstStyle/>
           <a:p>
@@ -5449,7 +5451,17 @@
             </a:r>
             <a:r>
               <a:rPr lang="en-US" sz="2400" dirty="0"/>
-              <a:t>of an HTML page, </a:t>
+              <a:t>of an HTML page</a:t>
+            </a:r>
+          </a:p>
+          <a:p>
+            <a:pPr>
+              <a:buFont typeface="Arial" panose="020B0604020202020204" pitchFamily="34" charset="0"/>
+              <a:buChar char="•"/>
+            </a:pPr>
+            <a:r>
+              <a:rPr lang="en-US" sz="2400" dirty="0"/>
+              <a:t> </a:t>
             </a:r>
             <a:r>
               <a:rPr lang="en-US" sz="2400" b="1" i="1" dirty="0"/>
@@ -6008,7 +6020,7 @@
             <p:ph idx="1"/>
             <p:extLst>
               <p:ext uri="{D42A27DB-BD31-4B8C-83A1-F6EECF244321}">
-                <p14:modId xmlns:p14="http://schemas.microsoft.com/office/powerpoint/2010/main" val="2945028005"/>
+                <p14:modId xmlns:p14="http://schemas.microsoft.com/office/powerpoint/2010/main" val="448492649"/>
               </p:ext>
             </p:extLst>
           </p:nvPr>
@@ -6095,7 +6107,7 @@
                     <a:p>
                       <a:r>
                         <a:rPr lang="en-US" sz="2000" dirty="0"/>
-                        <a:t>The paragraph element</a:t>
+                        <a:t>The paragraph element. For text.</a:t>
                       </a:r>
                     </a:p>
                   </a:txBody>
@@ -7488,13 +7500,13 @@
         </p:spPr>
         <p:txBody>
           <a:bodyPr>
-            <a:normAutofit fontScale="90000"/>
+            <a:normAutofit/>
           </a:bodyPr>
           <a:lstStyle/>
           <a:p>
             <a:r>
               <a:rPr lang="en-US" dirty="0"/>
-              <a:t>HTML – Web Forms</a:t>
+              <a:t>HTML – Forms</a:t>
             </a:r>
             <a:br>
               <a:rPr lang="en-US" dirty="0"/>
@@ -7564,7 +7576,7 @@
             </a:r>
             <a:r>
               <a:rPr lang="en-US" b="1" i="1" dirty="0"/>
-              <a:t>web form's </a:t>
+              <a:t>form's </a:t>
             </a:r>
             <a:r>
               <a:rPr lang="en-US" dirty="0"/>
@@ -8355,8 +8367,8 @@
         </p:nvSpPr>
         <p:spPr>
           <a:xfrm>
-            <a:off x="8747029" y="2748142"/>
-            <a:ext cx="3213183" cy="1200329"/>
+            <a:off x="6287002" y="2341699"/>
+            <a:ext cx="5631130" cy="1200329"/>
           </a:xfrm>
           <a:prstGeom prst="rect">
             <a:avLst/>
@@ -8392,7 +8404,13 @@
             </a:r>
             <a:r>
               <a:rPr lang="en-US" sz="2400" dirty="0"/>
-              <a:t> the form data is sent. GET, POST</a:t>
+              <a:t> the form data is sent. </a:t>
+            </a:r>
+          </a:p>
+          <a:p>
+            <a:r>
+              <a:rPr lang="en-US" sz="2400" dirty="0"/>
+              <a:t>*ONLY GET and POST are valid for forms</a:t>
             </a:r>
           </a:p>
         </p:txBody>
@@ -8513,13 +8531,14 @@
           <p:nvPr/>
         </p:nvCxnSpPr>
         <p:spPr>
-          <a:xfrm rot="10800000" flipV="1">
-            <a:off x="7154563" y="3348306"/>
-            <a:ext cx="1592467" cy="823531"/>
+          <a:xfrm rot="10800000" flipH="1" flipV="1">
+            <a:off x="6287002" y="2941864"/>
+            <a:ext cx="1028200" cy="1204502"/>
           </a:xfrm>
-          <a:prstGeom prst="bentConnector3">
+          <a:prstGeom prst="bentConnector4">
             <a:avLst>
-              <a:gd name="adj1" fmla="val 100437"/>
+              <a:gd name="adj1" fmla="val -22233"/>
+              <a:gd name="adj2" fmla="val 74913"/>
             </a:avLst>
           </a:prstGeom>
           <a:ln w="25400">
@@ -8626,7 +8645,7 @@
         </p:blipFill>
         <p:spPr>
           <a:xfrm>
-            <a:off x="6917207" y="2142066"/>
+            <a:off x="6869395" y="2100231"/>
             <a:ext cx="4426303" cy="3760788"/>
           </a:xfrm>
           <a:prstGeom prst="rect">
@@ -8661,7 +8680,7 @@
         </p:blipFill>
         <p:spPr>
           <a:xfrm>
-            <a:off x="932298" y="2142066"/>
+            <a:off x="884486" y="2100231"/>
             <a:ext cx="5984909" cy="3760788"/>
           </a:xfrm>
           <a:prstGeom prst="rect">
@@ -8674,6 +8693,252 @@
           </a:effectLst>
         </p:spPr>
       </p:pic>
+      <p:sp>
+        <p:nvSpPr>
+          <p:cNvPr id="3" name="TextBox 2">
+            <a:extLst>
+              <a:ext uri="{FF2B5EF4-FFF2-40B4-BE49-F238E27FC236}">
+                <a16:creationId xmlns:a16="http://schemas.microsoft.com/office/drawing/2014/main" id="{C1DD7C67-C9C4-4546-AE7A-8DAB1F4858DF}"/>
+              </a:ext>
+            </a:extLst>
+          </p:cNvPr>
+          <p:cNvSpPr txBox="1"/>
+          <p:nvPr/>
+        </p:nvSpPr>
+        <p:spPr>
+          <a:xfrm>
+            <a:off x="834655" y="6442844"/>
+            <a:ext cx="11283311" cy="369332"/>
+          </a:xfrm>
+          <a:prstGeom prst="rect">
+            <a:avLst/>
+          </a:prstGeom>
+          <a:solidFill>
+            <a:srgbClr val="FFFF00"/>
+          </a:solidFill>
+        </p:spPr>
+        <p:txBody>
+          <a:bodyPr wrap="square" rtlCol="0">
+            <a:spAutoFit/>
+          </a:bodyPr>
+          <a:lstStyle/>
+          <a:p>
+            <a:pPr algn="r"/>
+            <a:r>
+              <a:rPr lang="en-US" dirty="0"/>
+              <a:t>*the </a:t>
+            </a:r>
+            <a:r>
+              <a:rPr lang="en-US" b="1" i="1" dirty="0"/>
+              <a:t>name attribute is the name sent back to the server so you can access the user inputted value in the controller</a:t>
+            </a:r>
+          </a:p>
+        </p:txBody>
+      </p:sp>
+      <p:sp>
+        <p:nvSpPr>
+          <p:cNvPr id="6" name="Rectangle 5">
+            <a:extLst>
+              <a:ext uri="{FF2B5EF4-FFF2-40B4-BE49-F238E27FC236}">
+                <a16:creationId xmlns:a16="http://schemas.microsoft.com/office/drawing/2014/main" id="{C925F51A-F3ED-4D83-B70A-041A6046B61B}"/>
+              </a:ext>
+            </a:extLst>
+          </p:cNvPr>
+          <p:cNvSpPr/>
+          <p:nvPr/>
+        </p:nvSpPr>
+        <p:spPr>
+          <a:xfrm>
+            <a:off x="3147237" y="4109484"/>
+            <a:ext cx="1297172" cy="260497"/>
+          </a:xfrm>
+          <a:prstGeom prst="rect">
+            <a:avLst/>
+          </a:prstGeom>
+          <a:solidFill>
+            <a:srgbClr val="FFFF00">
+              <a:alpha val="20000"/>
+            </a:srgbClr>
+          </a:solidFill>
+        </p:spPr>
+        <p:style>
+          <a:lnRef idx="2">
+            <a:schemeClr val="accent1">
+              <a:shade val="50000"/>
+            </a:schemeClr>
+          </a:lnRef>
+          <a:fillRef idx="1">
+            <a:schemeClr val="accent1"/>
+          </a:fillRef>
+          <a:effectRef idx="0">
+            <a:schemeClr val="accent1"/>
+          </a:effectRef>
+          <a:fontRef idx="minor">
+            <a:schemeClr val="lt1"/>
+          </a:fontRef>
+        </p:style>
+        <p:txBody>
+          <a:bodyPr rtlCol="0" anchor="ctr"/>
+          <a:lstStyle/>
+          <a:p>
+            <a:pPr algn="ctr"/>
+            <a:endParaRPr lang="en-US"/>
+          </a:p>
+        </p:txBody>
+      </p:sp>
+      <p:sp>
+        <p:nvSpPr>
+          <p:cNvPr id="7" name="Rectangle 6">
+            <a:extLst>
+              <a:ext uri="{FF2B5EF4-FFF2-40B4-BE49-F238E27FC236}">
+                <a16:creationId xmlns:a16="http://schemas.microsoft.com/office/drawing/2014/main" id="{19FDA661-A027-4818-A1E0-C3E7B3B66E27}"/>
+              </a:ext>
+            </a:extLst>
+          </p:cNvPr>
+          <p:cNvSpPr/>
+          <p:nvPr/>
+        </p:nvSpPr>
+        <p:spPr>
+          <a:xfrm>
+            <a:off x="4556051" y="3613298"/>
+            <a:ext cx="1749437" cy="288851"/>
+          </a:xfrm>
+          <a:prstGeom prst="rect">
+            <a:avLst/>
+          </a:prstGeom>
+          <a:solidFill>
+            <a:srgbClr val="FFFF00">
+              <a:alpha val="20000"/>
+            </a:srgbClr>
+          </a:solidFill>
+        </p:spPr>
+        <p:style>
+          <a:lnRef idx="2">
+            <a:schemeClr val="accent1">
+              <a:shade val="50000"/>
+            </a:schemeClr>
+          </a:lnRef>
+          <a:fillRef idx="1">
+            <a:schemeClr val="accent1"/>
+          </a:fillRef>
+          <a:effectRef idx="0">
+            <a:schemeClr val="accent1"/>
+          </a:effectRef>
+          <a:fontRef idx="minor">
+            <a:schemeClr val="lt1"/>
+          </a:fontRef>
+        </p:style>
+        <p:txBody>
+          <a:bodyPr rtlCol="0" anchor="ctr"/>
+          <a:lstStyle/>
+          <a:p>
+            <a:pPr algn="ctr"/>
+            <a:endParaRPr lang="en-US"/>
+          </a:p>
+        </p:txBody>
+      </p:sp>
+      <p:sp>
+        <p:nvSpPr>
+          <p:cNvPr id="8" name="Rectangle 7">
+            <a:extLst>
+              <a:ext uri="{FF2B5EF4-FFF2-40B4-BE49-F238E27FC236}">
+                <a16:creationId xmlns:a16="http://schemas.microsoft.com/office/drawing/2014/main" id="{77B4F7FD-4805-4807-93D3-9A0A71C927F3}"/>
+              </a:ext>
+            </a:extLst>
+          </p:cNvPr>
+          <p:cNvSpPr/>
+          <p:nvPr/>
+        </p:nvSpPr>
+        <p:spPr>
+          <a:xfrm>
+            <a:off x="3907465" y="2618446"/>
+            <a:ext cx="1749437" cy="288851"/>
+          </a:xfrm>
+          <a:prstGeom prst="rect">
+            <a:avLst/>
+          </a:prstGeom>
+          <a:solidFill>
+            <a:srgbClr val="FFFF00">
+              <a:alpha val="20000"/>
+            </a:srgbClr>
+          </a:solidFill>
+        </p:spPr>
+        <p:style>
+          <a:lnRef idx="2">
+            <a:schemeClr val="accent1">
+              <a:shade val="50000"/>
+            </a:schemeClr>
+          </a:lnRef>
+          <a:fillRef idx="1">
+            <a:schemeClr val="accent1"/>
+          </a:fillRef>
+          <a:effectRef idx="0">
+            <a:schemeClr val="accent1"/>
+          </a:effectRef>
+          <a:fontRef idx="minor">
+            <a:schemeClr val="lt1"/>
+          </a:fontRef>
+        </p:style>
+        <p:txBody>
+          <a:bodyPr rtlCol="0" anchor="ctr"/>
+          <a:lstStyle/>
+          <a:p>
+            <a:pPr algn="ctr"/>
+            <a:endParaRPr lang="en-US"/>
+          </a:p>
+        </p:txBody>
+      </p:sp>
+      <p:sp>
+        <p:nvSpPr>
+          <p:cNvPr id="9" name="Rectangle 8">
+            <a:extLst>
+              <a:ext uri="{FF2B5EF4-FFF2-40B4-BE49-F238E27FC236}">
+                <a16:creationId xmlns:a16="http://schemas.microsoft.com/office/drawing/2014/main" id="{A8D3BFB9-15BE-4794-97F2-039EC471F619}"/>
+              </a:ext>
+            </a:extLst>
+          </p:cNvPr>
+          <p:cNvSpPr/>
+          <p:nvPr/>
+        </p:nvSpPr>
+        <p:spPr>
+          <a:xfrm>
+            <a:off x="3258879" y="5572168"/>
+            <a:ext cx="1972340" cy="288851"/>
+          </a:xfrm>
+          <a:prstGeom prst="rect">
+            <a:avLst/>
+          </a:prstGeom>
+          <a:solidFill>
+            <a:srgbClr val="FFFF00">
+              <a:alpha val="20000"/>
+            </a:srgbClr>
+          </a:solidFill>
+        </p:spPr>
+        <p:style>
+          <a:lnRef idx="2">
+            <a:schemeClr val="accent1">
+              <a:shade val="50000"/>
+            </a:schemeClr>
+          </a:lnRef>
+          <a:fillRef idx="1">
+            <a:schemeClr val="accent1"/>
+          </a:fillRef>
+          <a:effectRef idx="0">
+            <a:schemeClr val="accent1"/>
+          </a:effectRef>
+          <a:fontRef idx="minor">
+            <a:schemeClr val="lt1"/>
+          </a:fontRef>
+        </p:style>
+        <p:txBody>
+          <a:bodyPr rtlCol="0" anchor="ctr"/>
+          <a:lstStyle/>
+          <a:p>
+            <a:pPr algn="ctr"/>
+            <a:endParaRPr lang="en-US"/>
+          </a:p>
+        </p:txBody>
+      </p:sp>
     </p:spTree>
     <p:extLst>
       <p:ext uri="{BB962C8B-B14F-4D97-AF65-F5344CB8AC3E}">
@@ -8901,6 +9166,125 @@
     <p:extLst>
       <p:ext uri="{BB962C8B-B14F-4D97-AF65-F5344CB8AC3E}">
         <p14:creationId xmlns:p14="http://schemas.microsoft.com/office/powerpoint/2010/main" val="3073706468"/>
+      </p:ext>
+    </p:extLst>
+  </p:cSld>
+  <p:clrMapOvr>
+    <a:masterClrMapping/>
+  </p:clrMapOvr>
+</p:sld>
+</file>
+
+<file path=ppt/slides/slide23.xml><?xml version="1.0" encoding="utf-8"?>
+<p:sld xmlns:a="http://schemas.openxmlformats.org/drawingml/2006/main" xmlns:r="http://schemas.openxmlformats.org/officeDocument/2006/relationships" xmlns:p="http://schemas.openxmlformats.org/presentationml/2006/main">
+  <p:cSld>
+    <p:spTree>
+      <p:nvGrpSpPr>
+        <p:cNvPr id="1" name=""/>
+        <p:cNvGrpSpPr/>
+        <p:nvPr/>
+      </p:nvGrpSpPr>
+      <p:grpSpPr>
+        <a:xfrm>
+          <a:off x="0" y="0"/>
+          <a:ext cx="0" cy="0"/>
+          <a:chOff x="0" y="0"/>
+          <a:chExt cx="0" cy="0"/>
+        </a:xfrm>
+      </p:grpSpPr>
+      <p:sp>
+        <p:nvSpPr>
+          <p:cNvPr id="2" name="Title 1">
+            <a:extLst>
+              <a:ext uri="{FF2B5EF4-FFF2-40B4-BE49-F238E27FC236}">
+                <a16:creationId xmlns:a16="http://schemas.microsoft.com/office/drawing/2014/main" id="{B471D949-188A-40F4-A733-EC2AB2DE2392}"/>
+              </a:ext>
+            </a:extLst>
+          </p:cNvPr>
+          <p:cNvSpPr>
+            <a:spLocks noGrp="1"/>
+          </p:cNvSpPr>
+          <p:nvPr>
+            <p:ph type="title"/>
+          </p:nvPr>
+        </p:nvSpPr>
+        <p:spPr/>
+        <p:txBody>
+          <a:bodyPr/>
+          <a:lstStyle/>
+          <a:p>
+            <a:r>
+              <a:rPr lang="en-US" dirty="0"/>
+              <a:t>Input Attribute Purposes</a:t>
+            </a:r>
+          </a:p>
+        </p:txBody>
+      </p:sp>
+      <p:sp>
+        <p:nvSpPr>
+          <p:cNvPr id="3" name="Content Placeholder 2">
+            <a:extLst>
+              <a:ext uri="{FF2B5EF4-FFF2-40B4-BE49-F238E27FC236}">
+                <a16:creationId xmlns:a16="http://schemas.microsoft.com/office/drawing/2014/main" id="{7C672694-CF3D-4EB4-9BD6-0C57B938E2F7}"/>
+              </a:ext>
+            </a:extLst>
+          </p:cNvPr>
+          <p:cNvSpPr>
+            <a:spLocks noGrp="1"/>
+          </p:cNvSpPr>
+          <p:nvPr>
+            <p:ph idx="1"/>
+          </p:nvPr>
+        </p:nvSpPr>
+        <p:spPr/>
+        <p:txBody>
+          <a:bodyPr/>
+          <a:lstStyle/>
+          <a:p>
+            <a:r>
+              <a:rPr lang="en-US" dirty="0"/>
+              <a:t>id=“”</a:t>
+            </a:r>
+          </a:p>
+          <a:p>
+            <a:r>
+              <a:rPr lang="en-US" dirty="0"/>
+              <a:t>type=“”</a:t>
+            </a:r>
+          </a:p>
+          <a:p>
+            <a:r>
+              <a:rPr lang="en-US" dirty="0"/>
+              <a:t>name=“”</a:t>
+            </a:r>
+          </a:p>
+          <a:p>
+            <a:r>
+              <a:rPr lang="en-US" dirty="0"/>
+              <a:t>for=“”</a:t>
+            </a:r>
+          </a:p>
+          <a:p>
+            <a:r>
+              <a:rPr lang="en-US" dirty="0"/>
+              <a:t>placeholder=“”</a:t>
+            </a:r>
+          </a:p>
+          <a:p>
+            <a:r>
+              <a:rPr lang="en-US" dirty="0"/>
+              <a:t>value=“”</a:t>
+            </a:r>
+          </a:p>
+          <a:p>
+            <a:endParaRPr lang="en-US" dirty="0"/>
+          </a:p>
+        </p:txBody>
+      </p:sp>
+    </p:spTree>
+    <p:extLst>
+      <p:ext uri="{BB962C8B-B14F-4D97-AF65-F5344CB8AC3E}">
+        <p14:creationId xmlns:p14="http://schemas.microsoft.com/office/powerpoint/2010/main" val="2100785641"/>
       </p:ext>
     </p:extLst>
   </p:cSld>
@@ -10550,8 +10934,8 @@
         </p:nvSpPr>
         <p:spPr>
           <a:xfrm>
-            <a:off x="1739347" y="4870186"/>
-            <a:ext cx="10330071" cy="354660"/>
+            <a:off x="1673413" y="4868420"/>
+            <a:ext cx="10396006" cy="354660"/>
           </a:xfrm>
           <a:prstGeom prst="rect">
             <a:avLst/>
@@ -10709,23 +11093,7 @@
                   <a:schemeClr val="bg1"/>
                 </a:solidFill>
               </a:rPr>
-              <a:t>The body contains all the content that you want to show web users. (text, images, videos, </a:t>
-            </a:r>
-            <a:r>
-              <a:rPr lang="en-US" dirty="0" err="1">
-                <a:solidFill>
-                  <a:schemeClr val="bg1"/>
-                </a:solidFill>
-              </a:rPr>
-              <a:t>games,etc</a:t>
-            </a:r>
-            <a:r>
-              <a:rPr lang="en-US" dirty="0">
-                <a:solidFill>
-                  <a:schemeClr val="bg1"/>
-                </a:solidFill>
-              </a:rPr>
-              <a:t>)</a:t>
+              <a:t>The body contains all the content that you want to show web users. (text, images, videos, games, etc)</a:t>
             </a:r>
           </a:p>
         </p:txBody>
@@ -11574,7 +11942,7 @@
           <a:p>
             <a:r>
               <a:rPr lang="en-US" sz="2800" dirty="0"/>
-              <a:t>A nested element must be closed before it’s enclosing element is closed. The below will compile but the styling will not be applied.</a:t>
+              <a:t>A nested element must be closed before it’s enclosing element is closed. The below will display but the styling will not be applied.</a:t>
             </a:r>
           </a:p>
         </p:txBody>
@@ -11679,7 +12047,15 @@
             <a:pPr algn="ctr"/>
             <a:r>
               <a:rPr lang="en-US" sz="2800" dirty="0"/>
-              <a:t>Here are some examples of how to format elements. </a:t>
+              <a:t>Here are some examples of how to format elements </a:t>
+            </a:r>
+            <a:r>
+              <a:rPr lang="en-US" sz="2800" b="1" i="1" dirty="0"/>
+              <a:t>inline</a:t>
+            </a:r>
+            <a:r>
+              <a:rPr lang="en-US" sz="2800" dirty="0"/>
+              <a:t>. </a:t>
             </a:r>
           </a:p>
         </p:txBody>

</xml_diff>